<commit_message>
Add image to the consent box in the 6 decision-making styles page.
</commit_message>
<xml_diff>
--- a/modern agile/bugs-teams-applying_modern_agile.pptx
+++ b/modern agile/bugs-teams-applying_modern_agile.pptx
@@ -136,6 +136,11 @@
       </a:defRPr>
     </a:lvl9pPr>
   </p:defaultTextStyle>
+  <p:extLst>
+    <p:ext uri="{EFAFB233-063F-42B5-8137-9DF3F51BA10A}">
+      <p15:sldGuideLst xmlns:p15="http://schemas.microsoft.com/office/powerpoint/2012/main"/>
+    </p:ext>
+  </p:extLst>
 </p:presentation>
 </file>
 
@@ -221,7 +226,7 @@
           <a:p>
             <a:fld id="{B1067D13-32B8-4A7B-B665-953251AFB805}" type="datetimeFigureOut">
               <a:rPr lang="en-US" smtClean="0"/>
-              <a:t>5/8/2016</a:t>
+              <a:t>5/26/2016</a:t>
             </a:fld>
             <a:endParaRPr lang="en-US"/>
           </a:p>
@@ -2582,7 +2587,7 @@
           <a:p>
             <a:fld id="{2E013295-C366-4745-9576-BA74922772D5}" type="datetimeFigureOut">
               <a:rPr lang="en-US" smtClean="0"/>
-              <a:t>5/8/2016</a:t>
+              <a:t>5/26/2016</a:t>
             </a:fld>
             <a:endParaRPr lang="en-US"/>
           </a:p>
@@ -2866,7 +2871,7 @@
           <a:p>
             <a:fld id="{2E013295-C366-4745-9576-BA74922772D5}" type="datetimeFigureOut">
               <a:rPr lang="en-US" smtClean="0"/>
-              <a:t>5/8/2016</a:t>
+              <a:t>5/26/2016</a:t>
             </a:fld>
             <a:endParaRPr lang="en-US"/>
           </a:p>
@@ -3060,7 +3065,7 @@
           <a:p>
             <a:fld id="{2E013295-C366-4745-9576-BA74922772D5}" type="datetimeFigureOut">
               <a:rPr lang="en-US" smtClean="0"/>
-              <a:t>5/8/2016</a:t>
+              <a:t>5/26/2016</a:t>
             </a:fld>
             <a:endParaRPr lang="en-US"/>
           </a:p>
@@ -3264,7 +3269,7 @@
           <a:p>
             <a:fld id="{2E013295-C366-4745-9576-BA74922772D5}" type="datetimeFigureOut">
               <a:rPr lang="en-US" smtClean="0"/>
-              <a:t>5/8/2016</a:t>
+              <a:t>5/26/2016</a:t>
             </a:fld>
             <a:endParaRPr lang="en-US"/>
           </a:p>
@@ -3458,7 +3463,7 @@
           <a:p>
             <a:fld id="{2E013295-C366-4745-9576-BA74922772D5}" type="datetimeFigureOut">
               <a:rPr lang="en-US" smtClean="0"/>
-              <a:t>5/8/2016</a:t>
+              <a:t>5/26/2016</a:t>
             </a:fld>
             <a:endParaRPr lang="en-US"/>
           </a:p>
@@ -3829,7 +3834,7 @@
           <a:p>
             <a:fld id="{2E013295-C366-4745-9576-BA74922772D5}" type="datetimeFigureOut">
               <a:rPr lang="en-US" smtClean="0"/>
-              <a:t>5/8/2016</a:t>
+              <a:t>5/26/2016</a:t>
             </a:fld>
             <a:endParaRPr lang="en-US"/>
           </a:p>
@@ -4092,7 +4097,7 @@
           <a:p>
             <a:fld id="{2E013295-C366-4745-9576-BA74922772D5}" type="datetimeFigureOut">
               <a:rPr lang="en-US" smtClean="0"/>
-              <a:t>5/8/2016</a:t>
+              <a:t>5/26/2016</a:t>
             </a:fld>
             <a:endParaRPr lang="en-US"/>
           </a:p>
@@ -4483,7 +4488,7 @@
           <a:p>
             <a:fld id="{2E013295-C366-4745-9576-BA74922772D5}" type="datetimeFigureOut">
               <a:rPr lang="en-US" smtClean="0"/>
-              <a:t>5/8/2016</a:t>
+              <a:t>5/26/2016</a:t>
             </a:fld>
             <a:endParaRPr lang="en-US"/>
           </a:p>
@@ -4625,7 +4630,7 @@
           <a:p>
             <a:fld id="{2E013295-C366-4745-9576-BA74922772D5}" type="datetimeFigureOut">
               <a:rPr lang="en-US" smtClean="0"/>
-              <a:t>5/8/2016</a:t>
+              <a:t>5/26/2016</a:t>
             </a:fld>
             <a:endParaRPr lang="en-US"/>
           </a:p>
@@ -4744,7 +4749,7 @@
           <a:p>
             <a:fld id="{2E013295-C366-4745-9576-BA74922772D5}" type="datetimeFigureOut">
               <a:rPr lang="en-US" smtClean="0"/>
-              <a:t>5/8/2016</a:t>
+              <a:t>5/26/2016</a:t>
             </a:fld>
             <a:endParaRPr lang="en-US"/>
           </a:p>
@@ -5052,7 +5057,7 @@
           <a:p>
             <a:fld id="{2E013295-C366-4745-9576-BA74922772D5}" type="datetimeFigureOut">
               <a:rPr lang="en-US" smtClean="0"/>
-              <a:t>5/8/2016</a:t>
+              <a:t>5/26/2016</a:t>
             </a:fld>
             <a:endParaRPr lang="en-US"/>
           </a:p>
@@ -7309,6 +7314,36 @@
           <a:xfrm>
             <a:off x="9316388" y="4123475"/>
             <a:ext cx="1717107" cy="2017752"/>
+          </a:xfrm>
+          <a:prstGeom prst="rect">
+            <a:avLst/>
+          </a:prstGeom>
+        </p:spPr>
+      </p:pic>
+      <p:pic>
+        <p:nvPicPr>
+          <p:cNvPr id="2" name="Picture 1"/>
+          <p:cNvPicPr>
+            <a:picLocks noChangeAspect="1"/>
+          </p:cNvPicPr>
+          <p:nvPr/>
+        </p:nvPicPr>
+        <p:blipFill>
+          <a:blip r:embed="rId4">
+            <a:extLst>
+              <a:ext uri="{28A0092B-C50C-407E-A947-70E740481C1C}">
+                <a14:useLocalDpi xmlns:a14="http://schemas.microsoft.com/office/drawing/2010/main" val="0"/>
+              </a:ext>
+            </a:extLst>
+          </a:blip>
+          <a:stretch>
+            <a:fillRect/>
+          </a:stretch>
+        </p:blipFill>
+        <p:spPr>
+          <a:xfrm>
+            <a:off x="4793129" y="4137021"/>
+            <a:ext cx="2170766" cy="1990659"/>
           </a:xfrm>
           <a:prstGeom prst="rect">
             <a:avLst/>

</xml_diff>